<commit_message>
updates, added background image
</commit_message>
<xml_diff>
--- a/Libraries/_assets/splashimage.pptx
+++ b/Libraries/_assets/splashimage.pptx
@@ -243,7 +243,7 @@
           <a:p>
             <a:fld id="{93B2AF06-22BE-43A3-B194-6DF8A5BC8DDA}" type="datetimeFigureOut">
               <a:rPr lang="en-US" smtClean="0"/>
-              <a:t>5/7/2015</a:t>
+              <a:t>5/8/2015</a:t>
             </a:fld>
             <a:endParaRPr lang="en-US"/>
           </a:p>
@@ -413,7 +413,7 @@
           <a:p>
             <a:fld id="{93B2AF06-22BE-43A3-B194-6DF8A5BC8DDA}" type="datetimeFigureOut">
               <a:rPr lang="en-US" smtClean="0"/>
-              <a:t>5/7/2015</a:t>
+              <a:t>5/8/2015</a:t>
             </a:fld>
             <a:endParaRPr lang="en-US"/>
           </a:p>
@@ -593,7 +593,7 @@
           <a:p>
             <a:fld id="{93B2AF06-22BE-43A3-B194-6DF8A5BC8DDA}" type="datetimeFigureOut">
               <a:rPr lang="en-US" smtClean="0"/>
-              <a:t>5/7/2015</a:t>
+              <a:t>5/8/2015</a:t>
             </a:fld>
             <a:endParaRPr lang="en-US"/>
           </a:p>
@@ -763,7 +763,7 @@
           <a:p>
             <a:fld id="{93B2AF06-22BE-43A3-B194-6DF8A5BC8DDA}" type="datetimeFigureOut">
               <a:rPr lang="en-US" smtClean="0"/>
-              <a:t>5/7/2015</a:t>
+              <a:t>5/8/2015</a:t>
             </a:fld>
             <a:endParaRPr lang="en-US"/>
           </a:p>
@@ -1009,7 +1009,7 @@
           <a:p>
             <a:fld id="{93B2AF06-22BE-43A3-B194-6DF8A5BC8DDA}" type="datetimeFigureOut">
               <a:rPr lang="en-US" smtClean="0"/>
-              <a:t>5/7/2015</a:t>
+              <a:t>5/8/2015</a:t>
             </a:fld>
             <a:endParaRPr lang="en-US"/>
           </a:p>
@@ -1241,7 +1241,7 @@
           <a:p>
             <a:fld id="{93B2AF06-22BE-43A3-B194-6DF8A5BC8DDA}" type="datetimeFigureOut">
               <a:rPr lang="en-US" smtClean="0"/>
-              <a:t>5/7/2015</a:t>
+              <a:t>5/8/2015</a:t>
             </a:fld>
             <a:endParaRPr lang="en-US"/>
           </a:p>
@@ -1608,7 +1608,7 @@
           <a:p>
             <a:fld id="{93B2AF06-22BE-43A3-B194-6DF8A5BC8DDA}" type="datetimeFigureOut">
               <a:rPr lang="en-US" smtClean="0"/>
-              <a:t>5/7/2015</a:t>
+              <a:t>5/8/2015</a:t>
             </a:fld>
             <a:endParaRPr lang="en-US"/>
           </a:p>
@@ -1726,7 +1726,7 @@
           <a:p>
             <a:fld id="{93B2AF06-22BE-43A3-B194-6DF8A5BC8DDA}" type="datetimeFigureOut">
               <a:rPr lang="en-US" smtClean="0"/>
-              <a:t>5/7/2015</a:t>
+              <a:t>5/8/2015</a:t>
             </a:fld>
             <a:endParaRPr lang="en-US"/>
           </a:p>
@@ -1821,7 +1821,7 @@
           <a:p>
             <a:fld id="{93B2AF06-22BE-43A3-B194-6DF8A5BC8DDA}" type="datetimeFigureOut">
               <a:rPr lang="en-US" smtClean="0"/>
-              <a:t>5/7/2015</a:t>
+              <a:t>5/8/2015</a:t>
             </a:fld>
             <a:endParaRPr lang="en-US"/>
           </a:p>
@@ -2098,7 +2098,7 @@
           <a:p>
             <a:fld id="{93B2AF06-22BE-43A3-B194-6DF8A5BC8DDA}" type="datetimeFigureOut">
               <a:rPr lang="en-US" smtClean="0"/>
-              <a:t>5/7/2015</a:t>
+              <a:t>5/8/2015</a:t>
             </a:fld>
             <a:endParaRPr lang="en-US"/>
           </a:p>
@@ -2351,7 +2351,7 @@
           <a:p>
             <a:fld id="{93B2AF06-22BE-43A3-B194-6DF8A5BC8DDA}" type="datetimeFigureOut">
               <a:rPr lang="en-US" smtClean="0"/>
-              <a:t>5/7/2015</a:t>
+              <a:t>5/8/2015</a:t>
             </a:fld>
             <a:endParaRPr lang="en-US"/>
           </a:p>
@@ -2564,7 +2564,7 @@
           <a:p>
             <a:fld id="{93B2AF06-22BE-43A3-B194-6DF8A5BC8DDA}" type="datetimeFigureOut">
               <a:rPr lang="en-US" smtClean="0"/>
-              <a:t>5/7/2015</a:t>
+              <a:t>5/8/2015</a:t>
             </a:fld>
             <a:endParaRPr lang="en-US"/>
           </a:p>
@@ -3122,7 +3122,7 @@
                             </p:stCondLst>
                             <p:childTnLst>
                               <p:par>
-                                <p:cTn id="5" presetID="42" presetClass="path" presetSubtype="0" accel="50000" decel="50000" fill="hold" nodeType="withEffect">
+                                <p:cTn id="5" presetID="42" presetClass="path" presetSubtype="0" accel="50000" decel="50000" autoRev="1" fill="hold" nodeType="withEffect">
                                   <p:stCondLst>
                                     <p:cond delay="0"/>
                                   </p:stCondLst>

</xml_diff>